<commit_message>
Polishing up my slides a bit
</commit_message>
<xml_diff>
--- a/slides/1-Intro/intro.pptx
+++ b/slides/1-Intro/intro.pptx
@@ -5,10 +5,10 @@
     <p:sldMasterId id="2147483673" r:id="rId1"/>
   </p:sldMasterIdLst>
   <p:notesMasterIdLst>
-    <p:notesMasterId r:id="rId40"/>
+    <p:notesMasterId r:id="rId32"/>
   </p:notesMasterIdLst>
   <p:handoutMasterIdLst>
-    <p:handoutMasterId r:id="rId41"/>
+    <p:handoutMasterId r:id="rId33"/>
   </p:handoutMasterIdLst>
   <p:sldIdLst>
     <p:sldId id="328" r:id="rId2"/>
@@ -39,16 +39,8 @@
     <p:sldId id="331" r:id="rId27"/>
     <p:sldId id="289" r:id="rId28"/>
     <p:sldId id="290" r:id="rId29"/>
-    <p:sldId id="291" r:id="rId30"/>
-    <p:sldId id="292" r:id="rId31"/>
-    <p:sldId id="293" r:id="rId32"/>
-    <p:sldId id="335" r:id="rId33"/>
-    <p:sldId id="294" r:id="rId34"/>
-    <p:sldId id="312" r:id="rId35"/>
-    <p:sldId id="307" r:id="rId36"/>
-    <p:sldId id="326" r:id="rId37"/>
-    <p:sldId id="336" r:id="rId38"/>
-    <p:sldId id="337" r:id="rId39"/>
+    <p:sldId id="336" r:id="rId30"/>
+    <p:sldId id="337" r:id="rId31"/>
   </p:sldIdLst>
   <p:sldSz cx="12192000" cy="6858000"/>
   <p:notesSz cx="6858000" cy="9144000"/>
@@ -149,10 +141,10 @@
   </p:defaultTextStyle>
   <p:extLst>
     <p:ext uri="{EFAFB233-063F-42B5-8137-9DF3F51BA10A}">
-      <p15:sldGuideLst xmlns:p15="http://schemas.microsoft.com/office/powerpoint/2012/main" xmlns=""/>
+      <p15:sldGuideLst xmlns="" xmlns:p15="http://schemas.microsoft.com/office/powerpoint/2012/main"/>
     </p:ext>
     <p:ext uri="{2D200454-40CA-4A62-9FC3-DE9A4176ACB9}">
-      <p15:notesGuideLst xmlns:p15="http://schemas.microsoft.com/office/powerpoint/2012/main" xmlns=""/>
+      <p15:notesGuideLst xmlns="" xmlns:p15="http://schemas.microsoft.com/office/powerpoint/2012/main"/>
     </p:ext>
   </p:extLst>
 </p:presentation>
@@ -240,7 +232,7 @@
           <a:p>
             <a:fld id="{A1901BFF-BBF6-4249-9040-C117011E0510}" type="datetimeFigureOut">
               <a:rPr lang="en-US" smtClean="0"/>
-              <a:t>4/16/15</a:t>
+              <a:t>4/28/15</a:t>
             </a:fld>
             <a:endParaRPr lang="en-US" dirty="0"/>
           </a:p>
@@ -405,7 +397,7 @@
           <a:p>
             <a:fld id="{A94582A6-9929-0447-B85E-BC58B59E6D01}" type="datetimeFigureOut">
               <a:rPr lang="en-US" smtClean="0"/>
-              <a:t>4/16/15</a:t>
+              <a:t>4/28/15</a:t>
             </a:fld>
             <a:endParaRPr lang="en-US"/>
           </a:p>
@@ -2872,7 +2864,15 @@
             </a:r>
             <a:r>
               <a:rPr lang="en-US" dirty="0" smtClean="0"/>
-              <a:t> on Windows</a:t>
+              <a:t> on </a:t>
+            </a:r>
+            <a:r>
+              <a:rPr lang="en-US" dirty="0" smtClean="0"/>
+              <a:t>Windows (subject </a:t>
+            </a:r>
+            <a:r>
+              <a:rPr lang="en-US" smtClean="0"/>
+              <a:t>to change)</a:t>
             </a:r>
             <a:endParaRPr lang="en-US" dirty="0"/>
           </a:p>
@@ -3449,11 +3449,7 @@
             </a:r>
             <a:r>
               <a:rPr lang="en-US" dirty="0" smtClean="0"/>
-              <a:t> </a:t>
-            </a:r>
-            <a:r>
-              <a:rPr lang="en-US" dirty="0" smtClean="0"/>
-              <a:t>modules</a:t>
+              <a:t> modules</a:t>
             </a:r>
             <a:endParaRPr lang="en-US" dirty="0"/>
           </a:p>
@@ -3507,11 +3503,7 @@
             </a:r>
             <a:r>
               <a:rPr lang="en-US" dirty="0" smtClean="0"/>
-              <a:t> </a:t>
-            </a:r>
-            <a:r>
-              <a:rPr lang="en-US" dirty="0" smtClean="0"/>
-              <a:t>modules follow Node module’s conventions (</a:t>
+              <a:t> modules follow Node module’s conventions (</a:t>
             </a:r>
             <a:r>
               <a:rPr lang="en-US" dirty="0" err="1" smtClean="0"/>
@@ -3585,11 +3577,7 @@
             </a:r>
             <a:r>
               <a:rPr lang="en-US" dirty="0" smtClean="0"/>
-              <a:t> </a:t>
-            </a:r>
-            <a:r>
-              <a:rPr lang="en-US" dirty="0" smtClean="0"/>
-              <a:t>file module</a:t>
+              <a:t> file module</a:t>
             </a:r>
             <a:endParaRPr lang="en-US" dirty="0"/>
           </a:p>
@@ -4119,11 +4107,7 @@
             </a:r>
             <a:r>
               <a:rPr lang="en-US" dirty="0" smtClean="0"/>
-              <a:t> </a:t>
-            </a:r>
-            <a:r>
-              <a:rPr lang="en-US" dirty="0" smtClean="0"/>
-              <a:t>modules</a:t>
+              <a:t> modules</a:t>
             </a:r>
             <a:endParaRPr lang="en-US" dirty="0"/>
           </a:p>
@@ -4984,6 +4968,13 @@
   <p:clrMapOvr>
     <a:masterClrMapping/>
   </p:clrMapOvr>
+  <p:timing>
+    <p:tnLst>
+      <p:par>
+        <p:cTn xmlns:p14="http://schemas.microsoft.com/office/powerpoint/2010/main" id="1" dur="indefinite" restart="never" nodeType="tmRoot"/>
+      </p:par>
+    </p:tnLst>
+  </p:timing>
 </p:sld>
 </file>
 
@@ -5858,53 +5849,28 @@
             <p:ph type="title"/>
           </p:nvPr>
         </p:nvSpPr>
-        <p:spPr/>
+        <p:spPr>
+          <a:xfrm>
+            <a:off x="407672" y="3145324"/>
+            <a:ext cx="11338560" cy="548640"/>
+          </a:xfrm>
+        </p:spPr>
         <p:txBody>
           <a:bodyPr/>
           <a:lstStyle/>
           <a:p>
             <a:r>
               <a:rPr lang="en-US" dirty="0" smtClean="0"/>
-              <a:t>Starting a new project</a:t>
+              <a:t>Questions?</a:t>
             </a:r>
             <a:endParaRPr lang="en-US" dirty="0"/>
           </a:p>
         </p:txBody>
       </p:sp>
-      <p:pic>
-        <p:nvPicPr>
-          <p:cNvPr id="4" name="Picture 3" descr="Screen Shot 2015-01-30 at 3.34.38 PM.png"/>
-          <p:cNvPicPr>
-            <a:picLocks noChangeAspect="1"/>
-          </p:cNvPicPr>
-          <p:nvPr/>
-        </p:nvPicPr>
-        <p:blipFill>
-          <a:blip r:embed="rId2">
-            <a:extLst>
-              <a:ext uri="{28A0092B-C50C-407E-A947-70E740481C1C}">
-                <a14:useLocalDpi xmlns:a14="http://schemas.microsoft.com/office/drawing/2010/main" val="0"/>
-              </a:ext>
-            </a:extLst>
-          </a:blip>
-          <a:stretch>
-            <a:fillRect/>
-          </a:stretch>
-        </p:blipFill>
-        <p:spPr>
-          <a:xfrm>
-            <a:off x="438150" y="1804314"/>
-            <a:ext cx="5943600" cy="2349500"/>
-          </a:xfrm>
-          <a:prstGeom prst="rect">
-            <a:avLst/>
-          </a:prstGeom>
-        </p:spPr>
-      </p:pic>
     </p:spTree>
     <p:extLst>
       <p:ext uri="{BB962C8B-B14F-4D97-AF65-F5344CB8AC3E}">
-        <p14:creationId xmlns:p14="http://schemas.microsoft.com/office/powerpoint/2010/main" val="1308721409"/>
+        <p14:creationId xmlns:p14="http://schemas.microsoft.com/office/powerpoint/2010/main" val="3336554082"/>
       </p:ext>
     </p:extLst>
   </p:cSld>
@@ -6069,256 +6035,7 @@
           <a:p>
             <a:r>
               <a:rPr lang="en-US" dirty="0" smtClean="0"/>
-              <a:t>Running on </a:t>
-            </a:r>
-            <a:r>
-              <a:rPr lang="en-US" dirty="0" err="1" smtClean="0"/>
-              <a:t>iOS</a:t>
-            </a:r>
-            <a:endParaRPr lang="en-US" dirty="0"/>
-          </a:p>
-        </p:txBody>
-      </p:sp>
-      <p:pic>
-        <p:nvPicPr>
-          <p:cNvPr id="4" name="Picture 3" descr="Screen Shot 2015-01-30 at 3.32.39 PM.png"/>
-          <p:cNvPicPr>
-            <a:picLocks noChangeAspect="1"/>
-          </p:cNvPicPr>
-          <p:nvPr/>
-        </p:nvPicPr>
-        <p:blipFill>
-          <a:blip r:embed="rId2">
-            <a:extLst>
-              <a:ext uri="{28A0092B-C50C-407E-A947-70E740481C1C}">
-                <a14:useLocalDpi xmlns:a14="http://schemas.microsoft.com/office/drawing/2010/main" val="0"/>
-              </a:ext>
-            </a:extLst>
-          </a:blip>
-          <a:stretch>
-            <a:fillRect/>
-          </a:stretch>
-        </p:blipFill>
-        <p:spPr>
-          <a:xfrm>
-            <a:off x="438150" y="2695717"/>
-            <a:ext cx="5130800" cy="1206500"/>
-          </a:xfrm>
-          <a:prstGeom prst="rect">
-            <a:avLst/>
-          </a:prstGeom>
-        </p:spPr>
-      </p:pic>
-      <p:pic>
-        <p:nvPicPr>
-          <p:cNvPr id="5" name="Picture 4" descr="Screen Shot 2015-01-30 at 3.00.05 PM.png"/>
-          <p:cNvPicPr>
-            <a:picLocks noChangeAspect="1"/>
-          </p:cNvPicPr>
-          <p:nvPr/>
-        </p:nvPicPr>
-        <p:blipFill>
-          <a:blip r:embed="rId3">
-            <a:extLst>
-              <a:ext uri="{28A0092B-C50C-407E-A947-70E740481C1C}">
-                <a14:useLocalDpi xmlns:a14="http://schemas.microsoft.com/office/drawing/2010/main" val="0"/>
-              </a:ext>
-            </a:extLst>
-          </a:blip>
-          <a:stretch>
-            <a:fillRect/>
-          </a:stretch>
-        </p:blipFill>
-        <p:spPr>
-          <a:xfrm>
-            <a:off x="5568950" y="329696"/>
-            <a:ext cx="4754023" cy="6858000"/>
-          </a:xfrm>
-          <a:prstGeom prst="rect">
-            <a:avLst/>
-          </a:prstGeom>
-        </p:spPr>
-      </p:pic>
-    </p:spTree>
-    <p:extLst>
-      <p:ext uri="{BB962C8B-B14F-4D97-AF65-F5344CB8AC3E}">
-        <p14:creationId xmlns:p14="http://schemas.microsoft.com/office/powerpoint/2010/main" val="4200135353"/>
-      </p:ext>
-    </p:extLst>
-  </p:cSld>
-  <p:clrMapOvr>
-    <a:masterClrMapping/>
-  </p:clrMapOvr>
-  <p:timing>
-    <p:tnLst>
-      <p:par>
-        <p:cTn xmlns:p14="http://schemas.microsoft.com/office/powerpoint/2010/main" id="1" dur="indefinite" restart="never" nodeType="tmRoot"/>
-      </p:par>
-    </p:tnLst>
-  </p:timing>
-</p:sld>
-</file>
-
-<file path=ppt/slides/slide31.xml><?xml version="1.0" encoding="utf-8"?>
-<p:sld xmlns:a="http://schemas.openxmlformats.org/drawingml/2006/main" xmlns:r="http://schemas.openxmlformats.org/officeDocument/2006/relationships" xmlns:p="http://schemas.openxmlformats.org/presentationml/2006/main">
-  <p:cSld>
-    <p:spTree>
-      <p:nvGrpSpPr>
-        <p:cNvPr id="1" name=""/>
-        <p:cNvGrpSpPr/>
-        <p:nvPr/>
-      </p:nvGrpSpPr>
-      <p:grpSpPr>
-        <a:xfrm>
-          <a:off x="0" y="0"/>
-          <a:ext cx="0" cy="0"/>
-          <a:chOff x="0" y="0"/>
-          <a:chExt cx="0" cy="0"/>
-        </a:xfrm>
-      </p:grpSpPr>
-      <p:sp>
-        <p:nvSpPr>
-          <p:cNvPr id="2" name="Title 1"/>
-          <p:cNvSpPr>
-            <a:spLocks noGrp="1"/>
-          </p:cNvSpPr>
-          <p:nvPr>
-            <p:ph type="title"/>
-          </p:nvPr>
-        </p:nvSpPr>
-        <p:spPr>
-          <a:xfrm>
-            <a:off x="316232" y="585004"/>
-            <a:ext cx="11338560" cy="548640"/>
-          </a:xfrm>
-        </p:spPr>
-        <p:txBody>
-          <a:bodyPr/>
-          <a:lstStyle/>
-          <a:p>
-            <a:r>
-              <a:rPr lang="en-US" dirty="0" smtClean="0"/>
-              <a:t>Running on Android</a:t>
-            </a:r>
-            <a:endParaRPr lang="en-US" dirty="0"/>
-          </a:p>
-        </p:txBody>
-      </p:sp>
-      <p:pic>
-        <p:nvPicPr>
-          <p:cNvPr id="4" name="Picture 3" descr="Screen Shot 2015-01-30 at 3.24.34 PM.png"/>
-          <p:cNvPicPr>
-            <a:picLocks noChangeAspect="1"/>
-          </p:cNvPicPr>
-          <p:nvPr/>
-        </p:nvPicPr>
-        <p:blipFill>
-          <a:blip r:embed="rId2">
-            <a:extLst>
-              <a:ext uri="{28A0092B-C50C-407E-A947-70E740481C1C}">
-                <a14:useLocalDpi xmlns:a14="http://schemas.microsoft.com/office/drawing/2010/main" val="0"/>
-              </a:ext>
-            </a:extLst>
-          </a:blip>
-          <a:stretch>
-            <a:fillRect/>
-          </a:stretch>
-        </p:blipFill>
-        <p:spPr>
-          <a:xfrm>
-            <a:off x="438150" y="2724002"/>
-            <a:ext cx="5765800" cy="1219200"/>
-          </a:xfrm>
-          <a:prstGeom prst="rect">
-            <a:avLst/>
-          </a:prstGeom>
-        </p:spPr>
-      </p:pic>
-      <p:pic>
-        <p:nvPicPr>
-          <p:cNvPr id="5" name="Picture 4" descr="Screen Shot 2015-01-30 at 3.31.03 PM.png"/>
-          <p:cNvPicPr>
-            <a:picLocks noChangeAspect="1"/>
-          </p:cNvPicPr>
-          <p:nvPr/>
-        </p:nvPicPr>
-        <p:blipFill>
-          <a:blip r:embed="rId3">
-            <a:extLst>
-              <a:ext uri="{28A0092B-C50C-407E-A947-70E740481C1C}">
-                <a14:useLocalDpi xmlns:a14="http://schemas.microsoft.com/office/drawing/2010/main" val="0"/>
-              </a:ext>
-            </a:extLst>
-          </a:blip>
-          <a:stretch>
-            <a:fillRect/>
-          </a:stretch>
-        </p:blipFill>
-        <p:spPr>
-          <a:xfrm>
-            <a:off x="6264604" y="138423"/>
-            <a:ext cx="4943757" cy="6272537"/>
-          </a:xfrm>
-          <a:prstGeom prst="rect">
-            <a:avLst/>
-          </a:prstGeom>
-        </p:spPr>
-      </p:pic>
-    </p:spTree>
-    <p:extLst>
-      <p:ext uri="{BB962C8B-B14F-4D97-AF65-F5344CB8AC3E}">
-        <p14:creationId xmlns:p14="http://schemas.microsoft.com/office/powerpoint/2010/main" val="397321656"/>
-      </p:ext>
-    </p:extLst>
-  </p:cSld>
-  <p:clrMapOvr>
-    <a:masterClrMapping/>
-  </p:clrMapOvr>
-  <p:timing>
-    <p:tnLst>
-      <p:par>
-        <p:cTn xmlns:p14="http://schemas.microsoft.com/office/powerpoint/2010/main" id="1" dur="indefinite" restart="never" nodeType="tmRoot"/>
-      </p:par>
-    </p:tnLst>
-  </p:timing>
-</p:sld>
-</file>
-
-<file path=ppt/slides/slide32.xml><?xml version="1.0" encoding="utf-8"?>
-<p:sld xmlns:a="http://schemas.openxmlformats.org/drawingml/2006/main" xmlns:r="http://schemas.openxmlformats.org/officeDocument/2006/relationships" xmlns:p="http://schemas.openxmlformats.org/presentationml/2006/main">
-  <p:cSld>
-    <p:spTree>
-      <p:nvGrpSpPr>
-        <p:cNvPr id="1" name=""/>
-        <p:cNvGrpSpPr/>
-        <p:nvPr/>
-      </p:nvGrpSpPr>
-      <p:grpSpPr>
-        <a:xfrm>
-          <a:off x="0" y="0"/>
-          <a:ext cx="0" cy="0"/>
-          <a:chOff x="0" y="0"/>
-          <a:chExt cx="0" cy="0"/>
-        </a:xfrm>
-      </p:grpSpPr>
-      <p:sp>
-        <p:nvSpPr>
-          <p:cNvPr id="2" name="Title 1"/>
-          <p:cNvSpPr>
-            <a:spLocks noGrp="1"/>
-          </p:cNvSpPr>
-          <p:nvPr>
-            <p:ph type="title"/>
-          </p:nvPr>
-        </p:nvSpPr>
-        <p:spPr/>
-        <p:txBody>
-          <a:bodyPr/>
-          <a:lstStyle/>
-          <a:p>
-            <a:r>
-              <a:rPr lang="en-US" dirty="0" smtClean="0"/>
-              <a:t>Creating Platform apps</a:t>
+              <a:t>Getting started</a:t>
             </a:r>
             <a:endParaRPr lang="en-US" dirty="0"/>
           </a:p>
@@ -6341,7 +6058,7 @@
           <a:p>
             <a:r>
               <a:rPr lang="en-US" dirty="0" smtClean="0"/>
-              <a:t>Demo</a:t>
+              <a:t>Clone …?</a:t>
             </a:r>
             <a:endParaRPr lang="en-US" dirty="0"/>
           </a:p>
@@ -6350,67 +6067,7 @@
     </p:spTree>
     <p:extLst>
       <p:ext uri="{BB962C8B-B14F-4D97-AF65-F5344CB8AC3E}">
-        <p14:creationId xmlns:p14="http://schemas.microsoft.com/office/powerpoint/2010/main" val="978386421"/>
-      </p:ext>
-    </p:extLst>
-  </p:cSld>
-  <p:clrMapOvr>
-    <a:masterClrMapping/>
-  </p:clrMapOvr>
-</p:sld>
-</file>
-
-<file path=ppt/slides/slide33.xml><?xml version="1.0" encoding="utf-8"?>
-<p:sld xmlns:a="http://schemas.openxmlformats.org/drawingml/2006/main" xmlns:r="http://schemas.openxmlformats.org/officeDocument/2006/relationships" xmlns:p="http://schemas.openxmlformats.org/presentationml/2006/main">
-  <p:cSld>
-    <p:spTree>
-      <p:nvGrpSpPr>
-        <p:cNvPr id="1" name=""/>
-        <p:cNvGrpSpPr/>
-        <p:nvPr/>
-      </p:nvGrpSpPr>
-      <p:grpSpPr>
-        <a:xfrm>
-          <a:off x="0" y="0"/>
-          <a:ext cx="0" cy="0"/>
-          <a:chOff x="0" y="0"/>
-          <a:chExt cx="0" cy="0"/>
-        </a:xfrm>
-      </p:grpSpPr>
-      <p:pic>
-        <p:nvPicPr>
-          <p:cNvPr id="3" name="Picture 2" descr="Screen Shot 2015-04-16 at 5.00.11 PM.png"/>
-          <p:cNvPicPr>
-            <a:picLocks noChangeAspect="1"/>
-          </p:cNvPicPr>
-          <p:nvPr/>
-        </p:nvPicPr>
-        <p:blipFill>
-          <a:blip r:embed="rId2">
-            <a:extLst>
-              <a:ext uri="{28A0092B-C50C-407E-A947-70E740481C1C}">
-                <a14:useLocalDpi xmlns:a14="http://schemas.microsoft.com/office/drawing/2010/main" val="0"/>
-              </a:ext>
-            </a:extLst>
-          </a:blip>
-          <a:stretch>
-            <a:fillRect/>
-          </a:stretch>
-        </p:blipFill>
-        <p:spPr>
-          <a:xfrm>
-            <a:off x="743847" y="0"/>
-            <a:ext cx="9159986" cy="6858000"/>
-          </a:xfrm>
-          <a:prstGeom prst="rect">
-            <a:avLst/>
-          </a:prstGeom>
-        </p:spPr>
-      </p:pic>
-    </p:spTree>
-    <p:extLst>
-      <p:ext uri="{BB962C8B-B14F-4D97-AF65-F5344CB8AC3E}">
-        <p14:creationId xmlns:p14="http://schemas.microsoft.com/office/powerpoint/2010/main" val="3048966640"/>
+        <p14:creationId xmlns:p14="http://schemas.microsoft.com/office/powerpoint/2010/main" val="2509900680"/>
       </p:ext>
     </p:extLst>
   </p:cSld>
@@ -6424,512 +6081,6 @@
       </p:par>
     </p:tnLst>
   </p:timing>
-</p:sld>
-</file>
-
-<file path=ppt/slides/slide34.xml><?xml version="1.0" encoding="utf-8"?>
-<p:sld xmlns:a="http://schemas.openxmlformats.org/drawingml/2006/main" xmlns:r="http://schemas.openxmlformats.org/officeDocument/2006/relationships" xmlns:p="http://schemas.openxmlformats.org/presentationml/2006/main">
-  <p:cSld>
-    <p:spTree>
-      <p:nvGrpSpPr>
-        <p:cNvPr id="1" name=""/>
-        <p:cNvGrpSpPr/>
-        <p:nvPr/>
-      </p:nvGrpSpPr>
-      <p:grpSpPr>
-        <a:xfrm>
-          <a:off x="0" y="0"/>
-          <a:ext cx="0" cy="0"/>
-          <a:chOff x="0" y="0"/>
-          <a:chExt cx="0" cy="0"/>
-        </a:xfrm>
-      </p:grpSpPr>
-      <p:sp>
-        <p:nvSpPr>
-          <p:cNvPr id="2" name="Title 1"/>
-          <p:cNvSpPr>
-            <a:spLocks noGrp="1"/>
-          </p:cNvSpPr>
-          <p:nvPr>
-            <p:ph type="title"/>
-          </p:nvPr>
-        </p:nvSpPr>
-        <p:spPr/>
-        <p:txBody>
-          <a:bodyPr/>
-          <a:lstStyle/>
-          <a:p>
-            <a:r>
-              <a:rPr lang="en-US" dirty="0" err="1" smtClean="0"/>
-              <a:t>app.js</a:t>
-            </a:r>
-            <a:endParaRPr lang="en-US" dirty="0"/>
-          </a:p>
-        </p:txBody>
-      </p:sp>
-      <p:pic>
-        <p:nvPicPr>
-          <p:cNvPr id="4" name="Picture 3" descr="Screen Shot 2015-02-18 at 12.47.34 PM.png"/>
-          <p:cNvPicPr>
-            <a:picLocks noChangeAspect="1"/>
-          </p:cNvPicPr>
-          <p:nvPr/>
-        </p:nvPicPr>
-        <p:blipFill>
-          <a:blip r:embed="rId2">
-            <a:extLst>
-              <a:ext uri="{28A0092B-C50C-407E-A947-70E740481C1C}">
-                <a14:useLocalDpi xmlns:a14="http://schemas.microsoft.com/office/drawing/2010/main" val="0"/>
-              </a:ext>
-            </a:extLst>
-          </a:blip>
-          <a:stretch>
-            <a:fillRect/>
-          </a:stretch>
-        </p:blipFill>
-        <p:spPr>
-          <a:xfrm>
-            <a:off x="254000" y="1822450"/>
-            <a:ext cx="8661400" cy="1739900"/>
-          </a:xfrm>
-          <a:prstGeom prst="rect">
-            <a:avLst/>
-          </a:prstGeom>
-        </p:spPr>
-      </p:pic>
-    </p:spTree>
-    <p:extLst>
-      <p:ext uri="{BB962C8B-B14F-4D97-AF65-F5344CB8AC3E}">
-        <p14:creationId xmlns:p14="http://schemas.microsoft.com/office/powerpoint/2010/main" val="1164316549"/>
-      </p:ext>
-    </p:extLst>
-  </p:cSld>
-  <p:clrMapOvr>
-    <a:masterClrMapping/>
-  </p:clrMapOvr>
-  <p:timing>
-    <p:tnLst>
-      <p:par>
-        <p:cTn xmlns:p14="http://schemas.microsoft.com/office/powerpoint/2010/main" id="1" dur="indefinite" restart="never" nodeType="tmRoot"/>
-      </p:par>
-    </p:tnLst>
-  </p:timing>
-</p:sld>
-</file>
-
-<file path=ppt/slides/slide35.xml><?xml version="1.0" encoding="utf-8"?>
-<p:sld xmlns:a="http://schemas.openxmlformats.org/drawingml/2006/main" xmlns:r="http://schemas.openxmlformats.org/officeDocument/2006/relationships" xmlns:p="http://schemas.openxmlformats.org/presentationml/2006/main">
-  <p:cSld>
-    <p:spTree>
-      <p:nvGrpSpPr>
-        <p:cNvPr id="1" name=""/>
-        <p:cNvGrpSpPr/>
-        <p:nvPr/>
-      </p:nvGrpSpPr>
-      <p:grpSpPr>
-        <a:xfrm>
-          <a:off x="0" y="0"/>
-          <a:ext cx="0" cy="0"/>
-          <a:chOff x="0" y="0"/>
-          <a:chExt cx="0" cy="0"/>
-        </a:xfrm>
-      </p:grpSpPr>
-      <p:sp>
-        <p:nvSpPr>
-          <p:cNvPr id="2" name="Title 1"/>
-          <p:cNvSpPr>
-            <a:spLocks noGrp="1"/>
-          </p:cNvSpPr>
-          <p:nvPr>
-            <p:ph type="title"/>
-          </p:nvPr>
-        </p:nvSpPr>
-        <p:spPr/>
-        <p:txBody>
-          <a:bodyPr/>
-          <a:lstStyle/>
-          <a:p>
-            <a:r>
-              <a:rPr lang="en-US" dirty="0" smtClean="0"/>
-              <a:t>Pages</a:t>
-            </a:r>
-            <a:endParaRPr lang="en-US" dirty="0"/>
-          </a:p>
-        </p:txBody>
-      </p:sp>
-      <p:sp>
-        <p:nvSpPr>
-          <p:cNvPr id="3" name="Text Placeholder 2"/>
-          <p:cNvSpPr>
-            <a:spLocks noGrp="1"/>
-          </p:cNvSpPr>
-          <p:nvPr>
-            <p:ph type="body" sz="quarter" idx="13"/>
-          </p:nvPr>
-        </p:nvSpPr>
-        <p:spPr>
-          <a:xfrm>
-            <a:off x="417830" y="1495425"/>
-            <a:ext cx="10331450" cy="1765935"/>
-          </a:xfrm>
-        </p:spPr>
-        <p:txBody>
-          <a:bodyPr>
-            <a:normAutofit lnSpcReduction="10000"/>
-          </a:bodyPr>
-          <a:lstStyle/>
-          <a:p>
-            <a:r>
-              <a:rPr lang="en-US" dirty="0" smtClean="0"/>
-              <a:t>XML markup structure</a:t>
-            </a:r>
-          </a:p>
-          <a:p>
-            <a:r>
-              <a:rPr lang="en-US" dirty="0" smtClean="0"/>
-              <a:t>Elements (e.g. </a:t>
-            </a:r>
-            <a:r>
-              <a:rPr lang="en-US" dirty="0" smtClean="0">
-                <a:latin typeface="Courier New"/>
-                <a:cs typeface="Courier New"/>
-              </a:rPr>
-              <a:t>&lt;Page&gt;, &lt;Label&gt;</a:t>
-            </a:r>
-            <a:r>
-              <a:rPr lang="en-US" dirty="0" smtClean="0"/>
-              <a:t>) are </a:t>
-            </a:r>
-            <a:r>
-              <a:rPr lang="en-US" dirty="0" err="1" smtClean="0"/>
-              <a:t>NativeScript</a:t>
-            </a:r>
-            <a:r>
-              <a:rPr lang="en-US" dirty="0" smtClean="0"/>
-              <a:t> </a:t>
-            </a:r>
-            <a:r>
-              <a:rPr lang="en-US" dirty="0" smtClean="0"/>
-              <a:t>modules</a:t>
-            </a:r>
-            <a:endParaRPr lang="en-US" dirty="0"/>
-          </a:p>
-        </p:txBody>
-      </p:sp>
-      <p:pic>
-        <p:nvPicPr>
-          <p:cNvPr id="4" name="Picture 3" descr="Screen Shot 2015-02-18 at 11.32.12 AM.png"/>
-          <p:cNvPicPr>
-            <a:picLocks noChangeAspect="1"/>
-          </p:cNvPicPr>
-          <p:nvPr/>
-        </p:nvPicPr>
-        <p:blipFill>
-          <a:blip r:embed="rId2">
-            <a:extLst>
-              <a:ext uri="{28A0092B-C50C-407E-A947-70E740481C1C}">
-                <a14:useLocalDpi xmlns:a14="http://schemas.microsoft.com/office/drawing/2010/main" val="0"/>
-              </a:ext>
-            </a:extLst>
-          </a:blip>
-          <a:stretch>
-            <a:fillRect/>
-          </a:stretch>
-        </p:blipFill>
-        <p:spPr>
-          <a:xfrm>
-            <a:off x="407670" y="3649980"/>
-            <a:ext cx="6642100" cy="1905000"/>
-          </a:xfrm>
-          <a:prstGeom prst="rect">
-            <a:avLst/>
-          </a:prstGeom>
-        </p:spPr>
-      </p:pic>
-    </p:spTree>
-    <p:extLst>
-      <p:ext uri="{BB962C8B-B14F-4D97-AF65-F5344CB8AC3E}">
-        <p14:creationId xmlns:p14="http://schemas.microsoft.com/office/powerpoint/2010/main" val="2624527523"/>
-      </p:ext>
-    </p:extLst>
-  </p:cSld>
-  <p:clrMapOvr>
-    <a:masterClrMapping/>
-  </p:clrMapOvr>
-  <p:timing>
-    <p:tnLst>
-      <p:par>
-        <p:cTn xmlns:p14="http://schemas.microsoft.com/office/powerpoint/2010/main" id="1" dur="indefinite" restart="never" nodeType="tmRoot"/>
-      </p:par>
-    </p:tnLst>
-  </p:timing>
-</p:sld>
-</file>
-
-<file path=ppt/slides/slide36.xml><?xml version="1.0" encoding="utf-8"?>
-<p:sld xmlns:a="http://schemas.openxmlformats.org/drawingml/2006/main" xmlns:r="http://schemas.openxmlformats.org/officeDocument/2006/relationships" xmlns:p="http://schemas.openxmlformats.org/presentationml/2006/main">
-  <p:cSld>
-    <p:spTree>
-      <p:nvGrpSpPr>
-        <p:cNvPr id="1" name=""/>
-        <p:cNvGrpSpPr/>
-        <p:nvPr/>
-      </p:nvGrpSpPr>
-      <p:grpSpPr>
-        <a:xfrm>
-          <a:off x="0" y="0"/>
-          <a:ext cx="0" cy="0"/>
-          <a:chOff x="0" y="0"/>
-          <a:chExt cx="0" cy="0"/>
-        </a:xfrm>
-      </p:grpSpPr>
-      <p:sp>
-        <p:nvSpPr>
-          <p:cNvPr id="2" name="Title 1"/>
-          <p:cNvSpPr>
-            <a:spLocks noGrp="1"/>
-          </p:cNvSpPr>
-          <p:nvPr>
-            <p:ph type="title"/>
-          </p:nvPr>
-        </p:nvSpPr>
-        <p:spPr>
-          <a:xfrm>
-            <a:off x="346712" y="219244"/>
-            <a:ext cx="11338560" cy="548640"/>
-          </a:xfrm>
-        </p:spPr>
-        <p:txBody>
-          <a:bodyPr/>
-          <a:lstStyle/>
-          <a:p>
-            <a:r>
-              <a:rPr lang="en-US" dirty="0" smtClean="0"/>
-              <a:t>Custom XML Components</a:t>
-            </a:r>
-            <a:endParaRPr lang="en-US" dirty="0"/>
-          </a:p>
-        </p:txBody>
-      </p:sp>
-      <p:pic>
-        <p:nvPicPr>
-          <p:cNvPr id="5" name="Picture 4" descr="Screen Shot 2015-03-12 at 9.55.16 AM.png"/>
-          <p:cNvPicPr>
-            <a:picLocks noChangeAspect="1"/>
-          </p:cNvPicPr>
-          <p:nvPr/>
-        </p:nvPicPr>
-        <p:blipFill>
-          <a:blip r:embed="rId2">
-            <a:extLst>
-              <a:ext uri="{28A0092B-C50C-407E-A947-70E740481C1C}">
-                <a14:useLocalDpi xmlns:a14="http://schemas.microsoft.com/office/drawing/2010/main" val="0"/>
-              </a:ext>
-            </a:extLst>
-          </a:blip>
-          <a:stretch>
-            <a:fillRect/>
-          </a:stretch>
-        </p:blipFill>
-        <p:spPr>
-          <a:xfrm>
-            <a:off x="299342" y="1066800"/>
-            <a:ext cx="7221598" cy="3672840"/>
-          </a:xfrm>
-          <a:prstGeom prst="rect">
-            <a:avLst/>
-          </a:prstGeom>
-        </p:spPr>
-      </p:pic>
-      <p:sp>
-        <p:nvSpPr>
-          <p:cNvPr id="6" name="Text Placeholder 2"/>
-          <p:cNvSpPr>
-            <a:spLocks noGrp="1"/>
-          </p:cNvSpPr>
-          <p:nvPr>
-            <p:ph type="body" sz="quarter" idx="13"/>
-          </p:nvPr>
-        </p:nvSpPr>
-        <p:spPr>
-          <a:xfrm>
-            <a:off x="153671" y="5071745"/>
-            <a:ext cx="9569450" cy="465455"/>
-          </a:xfrm>
-        </p:spPr>
-        <p:txBody>
-          <a:bodyPr>
-            <a:normAutofit/>
-          </a:bodyPr>
-          <a:lstStyle/>
-          <a:p>
-            <a:pPr indent="0">
-              <a:buNone/>
-            </a:pPr>
-            <a:r>
-              <a:rPr lang="en-US" sz="2400" dirty="0">
-                <a:hlinkClick r:id="rId3"/>
-              </a:rPr>
-              <a:t>http://docs.nativescript.org/ui-with-xml#custom-</a:t>
-            </a:r>
-            <a:r>
-              <a:rPr lang="en-US" sz="2400" dirty="0" smtClean="0">
-                <a:hlinkClick r:id="rId3"/>
-              </a:rPr>
-              <a:t>components</a:t>
-            </a:r>
-            <a:r>
-              <a:rPr lang="en-US" sz="2400" dirty="0" smtClean="0"/>
-              <a:t> </a:t>
-            </a:r>
-            <a:endParaRPr lang="en-US" sz="2400" dirty="0"/>
-          </a:p>
-        </p:txBody>
-      </p:sp>
-    </p:spTree>
-    <p:extLst>
-      <p:ext uri="{BB962C8B-B14F-4D97-AF65-F5344CB8AC3E}">
-        <p14:creationId xmlns:p14="http://schemas.microsoft.com/office/powerpoint/2010/main" val="3011203793"/>
-      </p:ext>
-    </p:extLst>
-  </p:cSld>
-  <p:clrMapOvr>
-    <a:masterClrMapping/>
-  </p:clrMapOvr>
-</p:sld>
-</file>
-
-<file path=ppt/slides/slide37.xml><?xml version="1.0" encoding="utf-8"?>
-<p:sld xmlns:a="http://schemas.openxmlformats.org/drawingml/2006/main" xmlns:r="http://schemas.openxmlformats.org/officeDocument/2006/relationships" xmlns:p="http://schemas.openxmlformats.org/presentationml/2006/main">
-  <p:cSld>
-    <p:spTree>
-      <p:nvGrpSpPr>
-        <p:cNvPr id="1" name=""/>
-        <p:cNvGrpSpPr/>
-        <p:nvPr/>
-      </p:nvGrpSpPr>
-      <p:grpSpPr>
-        <a:xfrm>
-          <a:off x="0" y="0"/>
-          <a:ext cx="0" cy="0"/>
-          <a:chOff x="0" y="0"/>
-          <a:chExt cx="0" cy="0"/>
-        </a:xfrm>
-      </p:grpSpPr>
-      <p:sp>
-        <p:nvSpPr>
-          <p:cNvPr id="2" name="Title 1"/>
-          <p:cNvSpPr>
-            <a:spLocks noGrp="1"/>
-          </p:cNvSpPr>
-          <p:nvPr>
-            <p:ph type="title"/>
-          </p:nvPr>
-        </p:nvSpPr>
-        <p:spPr>
-          <a:xfrm>
-            <a:off x="407672" y="3145324"/>
-            <a:ext cx="11338560" cy="548640"/>
-          </a:xfrm>
-        </p:spPr>
-        <p:txBody>
-          <a:bodyPr/>
-          <a:lstStyle/>
-          <a:p>
-            <a:r>
-              <a:rPr lang="en-US" dirty="0" smtClean="0"/>
-              <a:t>Questions?</a:t>
-            </a:r>
-            <a:endParaRPr lang="en-US" dirty="0"/>
-          </a:p>
-        </p:txBody>
-      </p:sp>
-    </p:spTree>
-    <p:extLst>
-      <p:ext uri="{BB962C8B-B14F-4D97-AF65-F5344CB8AC3E}">
-        <p14:creationId xmlns:p14="http://schemas.microsoft.com/office/powerpoint/2010/main" val="3336554082"/>
-      </p:ext>
-    </p:extLst>
-  </p:cSld>
-  <p:clrMapOvr>
-    <a:masterClrMapping/>
-  </p:clrMapOvr>
-</p:sld>
-</file>
-
-<file path=ppt/slides/slide38.xml><?xml version="1.0" encoding="utf-8"?>
-<p:sld xmlns:a="http://schemas.openxmlformats.org/drawingml/2006/main" xmlns:r="http://schemas.openxmlformats.org/officeDocument/2006/relationships" xmlns:p="http://schemas.openxmlformats.org/presentationml/2006/main">
-  <p:cSld>
-    <p:spTree>
-      <p:nvGrpSpPr>
-        <p:cNvPr id="1" name=""/>
-        <p:cNvGrpSpPr/>
-        <p:nvPr/>
-      </p:nvGrpSpPr>
-      <p:grpSpPr>
-        <a:xfrm>
-          <a:off x="0" y="0"/>
-          <a:ext cx="0" cy="0"/>
-          <a:chOff x="0" y="0"/>
-          <a:chExt cx="0" cy="0"/>
-        </a:xfrm>
-      </p:grpSpPr>
-      <p:sp>
-        <p:nvSpPr>
-          <p:cNvPr id="2" name="Title 1"/>
-          <p:cNvSpPr>
-            <a:spLocks noGrp="1"/>
-          </p:cNvSpPr>
-          <p:nvPr>
-            <p:ph type="title"/>
-          </p:nvPr>
-        </p:nvSpPr>
-        <p:spPr/>
-        <p:txBody>
-          <a:bodyPr/>
-          <a:lstStyle/>
-          <a:p>
-            <a:r>
-              <a:rPr lang="en-US" dirty="0" smtClean="0"/>
-              <a:t>Getting started</a:t>
-            </a:r>
-            <a:endParaRPr lang="en-US" dirty="0"/>
-          </a:p>
-        </p:txBody>
-      </p:sp>
-      <p:sp>
-        <p:nvSpPr>
-          <p:cNvPr id="3" name="Text Placeholder 2"/>
-          <p:cNvSpPr>
-            <a:spLocks noGrp="1"/>
-          </p:cNvSpPr>
-          <p:nvPr>
-            <p:ph type="body" sz="quarter" idx="13"/>
-          </p:nvPr>
-        </p:nvSpPr>
-        <p:spPr/>
-        <p:txBody>
-          <a:bodyPr/>
-          <a:lstStyle/>
-          <a:p>
-            <a:r>
-              <a:rPr lang="en-US" dirty="0" smtClean="0"/>
-              <a:t>Clone …?</a:t>
-            </a:r>
-            <a:endParaRPr lang="en-US" dirty="0"/>
-          </a:p>
-        </p:txBody>
-      </p:sp>
-    </p:spTree>
-    <p:extLst>
-      <p:ext uri="{BB962C8B-B14F-4D97-AF65-F5344CB8AC3E}">
-        <p14:creationId xmlns:p14="http://schemas.microsoft.com/office/powerpoint/2010/main" val="2509900680"/>
-      </p:ext>
-    </p:extLst>
-  </p:cSld>
-  <p:clrMapOvr>
-    <a:masterClrMapping/>
-  </p:clrMapOvr>
 </p:sld>
 </file>
 
@@ -7668,7 +6819,11 @@
           <a:p>
             <a:r>
               <a:rPr lang="en-US" dirty="0" smtClean="0"/>
-              <a:t>Open source!</a:t>
+              <a:t>Open source</a:t>
+            </a:r>
+            <a:r>
+              <a:rPr lang="en-US" dirty="0" smtClean="0"/>
+              <a:t>!</a:t>
             </a:r>
           </a:p>
         </p:txBody>
@@ -7683,6 +6838,13 @@
   <p:clrMapOvr>
     <a:masterClrMapping/>
   </p:clrMapOvr>
+  <p:timing>
+    <p:tnLst>
+      <p:par>
+        <p:cTn xmlns:p14="http://schemas.microsoft.com/office/powerpoint/2010/main" id="1" dur="indefinite" restart="never" nodeType="tmRoot"/>
+      </p:par>
+    </p:tnLst>
+  </p:timing>
 </p:sld>
 </file>
 
@@ -7825,7 +6987,7 @@
         </p:nvSpPr>
         <p:spPr>
           <a:xfrm>
-            <a:off x="2297431" y="2105025"/>
+            <a:off x="824231" y="1495425"/>
             <a:ext cx="2863849" cy="688975"/>
           </a:xfrm>
         </p:spPr>
@@ -7857,7 +7019,7 @@
         </p:blipFill>
         <p:spPr>
           <a:xfrm>
-            <a:off x="1582328" y="697061"/>
+            <a:off x="667928" y="219541"/>
             <a:ext cx="1181250" cy="1181250"/>
           </a:xfrm>
           <a:prstGeom prst="rect">
@@ -7881,7 +7043,7 @@
         </p:blipFill>
         <p:spPr>
           <a:xfrm>
-            <a:off x="1602648" y="3440261"/>
+            <a:off x="6123848" y="1804501"/>
             <a:ext cx="1181250" cy="1181250"/>
           </a:xfrm>
           <a:prstGeom prst="rect">
@@ -7911,7 +7073,7 @@
         </p:blipFill>
         <p:spPr>
           <a:xfrm>
-            <a:off x="4475480" y="554990"/>
+            <a:off x="3195320" y="152400"/>
             <a:ext cx="1732280" cy="1469598"/>
           </a:xfrm>
           <a:prstGeom prst="rect">
@@ -7941,7 +7103,7 @@
         </p:blipFill>
         <p:spPr>
           <a:xfrm>
-            <a:off x="4850130" y="3437890"/>
+            <a:off x="8741410" y="1802130"/>
             <a:ext cx="1184910" cy="1184910"/>
           </a:xfrm>
           <a:prstGeom prst="rect">
@@ -7959,7 +7121,7 @@
         </p:nvSpPr>
         <p:spPr>
           <a:xfrm>
-            <a:off x="2246631" y="5000625"/>
+            <a:off x="5934711" y="3151505"/>
             <a:ext cx="4641849" cy="810895"/>
           </a:xfrm>
           <a:prstGeom prst="rect">
@@ -8176,7 +7338,7 @@
         </p:nvSpPr>
         <p:spPr>
           <a:xfrm>
-            <a:off x="3282951" y="3598545"/>
+            <a:off x="7489191" y="1993265"/>
             <a:ext cx="994409" cy="882015"/>
           </a:xfrm>
           <a:prstGeom prst="rect">
@@ -8396,7 +7558,7 @@
         </p:nvSpPr>
         <p:spPr>
           <a:xfrm>
-            <a:off x="3161031" y="855345"/>
+            <a:off x="2063751" y="367665"/>
             <a:ext cx="994409" cy="882015"/>
           </a:xfrm>
           <a:prstGeom prst="rect">
@@ -8606,6 +7768,527 @@
           </a:p>
         </p:txBody>
       </p:sp>
+      <p:pic>
+        <p:nvPicPr>
+          <p:cNvPr id="2" name="Picture 1" descr="default_app_logo.png"/>
+          <p:cNvPicPr>
+            <a:picLocks noChangeAspect="1"/>
+          </p:cNvPicPr>
+          <p:nvPr/>
+        </p:nvPicPr>
+        <p:blipFill>
+          <a:blip r:embed="rId5">
+            <a:extLst>
+              <a:ext uri="{28A0092B-C50C-407E-A947-70E740481C1C}">
+                <a14:useLocalDpi xmlns:a14="http://schemas.microsoft.com/office/drawing/2010/main" val="0"/>
+              </a:ext>
+            </a:extLst>
+          </a:blip>
+          <a:stretch>
+            <a:fillRect/>
+          </a:stretch>
+        </p:blipFill>
+        <p:spPr>
+          <a:xfrm>
+            <a:off x="10048240" y="1727200"/>
+            <a:ext cx="1310640" cy="1310640"/>
+          </a:xfrm>
+          <a:prstGeom prst="rect">
+            <a:avLst/>
+          </a:prstGeom>
+        </p:spPr>
+      </p:pic>
+      <p:pic>
+        <p:nvPicPr>
+          <p:cNvPr id="11" name="Picture 10" descr="imgres.png"/>
+          <p:cNvPicPr>
+            <a:picLocks noChangeAspect="1"/>
+          </p:cNvPicPr>
+          <p:nvPr/>
+        </p:nvPicPr>
+        <p:blipFill>
+          <a:blip r:embed="rId6">
+            <a:extLst>
+              <a:ext uri="{28A0092B-C50C-407E-A947-70E740481C1C}">
+                <a14:useLocalDpi xmlns:a14="http://schemas.microsoft.com/office/drawing/2010/main" val="0"/>
+              </a:ext>
+            </a:extLst>
+          </a:blip>
+          <a:stretch>
+            <a:fillRect/>
+          </a:stretch>
+        </p:blipFill>
+        <p:spPr>
+          <a:xfrm>
+            <a:off x="3556000" y="3556000"/>
+            <a:ext cx="1245870" cy="1245870"/>
+          </a:xfrm>
+          <a:prstGeom prst="rect">
+            <a:avLst/>
+          </a:prstGeom>
+        </p:spPr>
+      </p:pic>
+      <p:sp>
+        <p:nvSpPr>
+          <p:cNvPr id="12" name="Text Placeholder 2"/>
+          <p:cNvSpPr txBox="1">
+            <a:spLocks/>
+          </p:cNvSpPr>
+          <p:nvPr/>
+        </p:nvSpPr>
+        <p:spPr>
+          <a:xfrm>
+            <a:off x="976631" y="4797425"/>
+            <a:ext cx="4723129" cy="1349375"/>
+          </a:xfrm>
+          <a:prstGeom prst="rect">
+            <a:avLst/>
+          </a:prstGeom>
+        </p:spPr>
+        <p:txBody>
+          <a:bodyPr vert="horz" lIns="91440" tIns="45720" rIns="91440" bIns="45720" rtlCol="0">
+            <a:normAutofit/>
+          </a:bodyPr>
+          <a:lstStyle>
+            <a:lvl1pPr marL="182880" indent="365760" algn="l" defTabSz="91440" rtl="0" eaLnBrk="1" latinLnBrk="0" hangingPunct="1">
+              <a:lnSpc>
+                <a:spcPct val="100000"/>
+              </a:lnSpc>
+              <a:spcBef>
+                <a:spcPts val="1000"/>
+              </a:spcBef>
+              <a:buClr>
+                <a:srgbClr val="3C59FD"/>
+              </a:buClr>
+              <a:buSzPct val="80000"/>
+              <a:buFont typeface="Arial" panose="020B0604020202020204" pitchFamily="34" charset="0"/>
+              <a:buChar char="•"/>
+              <a:defRPr sz="3600" kern="1200" baseline="0">
+                <a:solidFill>
+                  <a:schemeClr val="tx1"/>
+                </a:solidFill>
+                <a:latin typeface="+mn-lt"/>
+                <a:ea typeface="Open Sans Light" panose="020B0306030504020204" pitchFamily="34" charset="0"/>
+                <a:cs typeface="Open Sans Light" panose="020B0306030504020204" pitchFamily="34" charset="0"/>
+              </a:defRPr>
+            </a:lvl1pPr>
+            <a:lvl2pPr marL="182880" indent="182880" algn="l" defTabSz="914400" rtl="0" eaLnBrk="1" latinLnBrk="0" hangingPunct="1">
+              <a:lnSpc>
+                <a:spcPct val="90000"/>
+              </a:lnSpc>
+              <a:spcBef>
+                <a:spcPts val="500"/>
+              </a:spcBef>
+              <a:buClr>
+                <a:srgbClr val="3C59FD"/>
+              </a:buClr>
+              <a:buSzPct val="80000"/>
+              <a:buFont typeface="Arial" panose="020B0604020202020204" pitchFamily="34" charset="0"/>
+              <a:buChar char="•"/>
+              <a:tabLst>
+                <a:tab pos="301752" algn="l"/>
+              </a:tabLst>
+              <a:defRPr sz="4000" kern="1200" baseline="0">
+                <a:solidFill>
+                  <a:schemeClr val="tx1"/>
+                </a:solidFill>
+                <a:latin typeface="+mn-lt"/>
+                <a:ea typeface="Open Sans Light" panose="020B0306030504020204" pitchFamily="34" charset="0"/>
+                <a:cs typeface="Open Sans Light" panose="020B0306030504020204" pitchFamily="34" charset="0"/>
+              </a:defRPr>
+            </a:lvl2pPr>
+            <a:lvl3pPr marL="365760" indent="365760" algn="l" defTabSz="914400" rtl="0" eaLnBrk="1" latinLnBrk="0" hangingPunct="1">
+              <a:lnSpc>
+                <a:spcPct val="100000"/>
+              </a:lnSpc>
+              <a:spcBef>
+                <a:spcPts val="500"/>
+              </a:spcBef>
+              <a:buClr>
+                <a:srgbClr val="3C59FD"/>
+              </a:buClr>
+              <a:buSzPct val="80000"/>
+              <a:buFont typeface="Arial" panose="020B0604020202020204" pitchFamily="34" charset="0"/>
+              <a:buChar char="•"/>
+              <a:defRPr sz="2800" kern="1200" baseline="0">
+                <a:solidFill>
+                  <a:schemeClr val="tx1"/>
+                </a:solidFill>
+                <a:latin typeface="+mn-lt"/>
+                <a:ea typeface="Open Sans" panose="020B0606030504020204" pitchFamily="34" charset="0"/>
+                <a:cs typeface="Open Sans" panose="020B0606030504020204" pitchFamily="34" charset="0"/>
+              </a:defRPr>
+            </a:lvl3pPr>
+            <a:lvl4pPr marL="548640" indent="182880" algn="l" defTabSz="914400" rtl="0" eaLnBrk="1" latinLnBrk="0" hangingPunct="1">
+              <a:lnSpc>
+                <a:spcPct val="90000"/>
+              </a:lnSpc>
+              <a:spcBef>
+                <a:spcPts val="500"/>
+              </a:spcBef>
+              <a:buClr>
+                <a:srgbClr val="3C59FD"/>
+              </a:buClr>
+              <a:buSzPct val="80000"/>
+              <a:buFont typeface="Arial" panose="020B0604020202020204" pitchFamily="34" charset="0"/>
+              <a:buChar char="•"/>
+              <a:defRPr sz="1800" kern="1200" baseline="0">
+                <a:solidFill>
+                  <a:schemeClr val="tx1"/>
+                </a:solidFill>
+                <a:latin typeface="+mn-lt"/>
+                <a:ea typeface="Open Sans" panose="020B0606030504020204" pitchFamily="34" charset="0"/>
+                <a:cs typeface="Open Sans" panose="020B0606030504020204" pitchFamily="34" charset="0"/>
+              </a:defRPr>
+            </a:lvl4pPr>
+            <a:lvl5pPr marL="731520" indent="182880" algn="l" defTabSz="914400" rtl="0" eaLnBrk="1" latinLnBrk="0" hangingPunct="1">
+              <a:lnSpc>
+                <a:spcPct val="90000"/>
+              </a:lnSpc>
+              <a:spcBef>
+                <a:spcPts val="500"/>
+              </a:spcBef>
+              <a:buClr>
+                <a:srgbClr val="3C59FD"/>
+              </a:buClr>
+              <a:buSzPct val="80000"/>
+              <a:buFont typeface="Arial" panose="020B0604020202020204" pitchFamily="34" charset="0"/>
+              <a:buChar char="•"/>
+              <a:defRPr sz="1600" kern="1200" baseline="0">
+                <a:solidFill>
+                  <a:schemeClr val="tx1"/>
+                </a:solidFill>
+                <a:latin typeface="+mn-lt"/>
+                <a:ea typeface="Open Sans" panose="020B0606030504020204" pitchFamily="34" charset="0"/>
+                <a:cs typeface="Open Sans" panose="020B0606030504020204" pitchFamily="34" charset="0"/>
+              </a:defRPr>
+            </a:lvl5pPr>
+            <a:lvl6pPr marL="2514600" indent="-228600" algn="l" defTabSz="914400" rtl="0" eaLnBrk="1" latinLnBrk="0" hangingPunct="1">
+              <a:lnSpc>
+                <a:spcPct val="90000"/>
+              </a:lnSpc>
+              <a:spcBef>
+                <a:spcPts val="500"/>
+              </a:spcBef>
+              <a:buFont typeface="Arial" panose="020B0604020202020204" pitchFamily="34" charset="0"/>
+              <a:buChar char="•"/>
+              <a:defRPr sz="1200" kern="1200" cap="all" spc="0" baseline="0">
+                <a:solidFill>
+                  <a:srgbClr val="95BC46"/>
+                </a:solidFill>
+                <a:latin typeface="Open Sans" panose="020B0606030504020204" pitchFamily="34" charset="0"/>
+                <a:ea typeface="Open Sans" panose="020B0606030504020204" pitchFamily="34" charset="0"/>
+                <a:cs typeface="Open Sans" panose="020B0606030504020204" pitchFamily="34" charset="0"/>
+              </a:defRPr>
+            </a:lvl6pPr>
+            <a:lvl7pPr marL="2971800" indent="-228600" algn="l" defTabSz="914400" rtl="0" eaLnBrk="1" latinLnBrk="0" hangingPunct="1">
+              <a:lnSpc>
+                <a:spcPct val="90000"/>
+              </a:lnSpc>
+              <a:spcBef>
+                <a:spcPts val="500"/>
+              </a:spcBef>
+              <a:buFont typeface="Arial" panose="020B0604020202020204" pitchFamily="34" charset="0"/>
+              <a:buChar char="•"/>
+              <a:defRPr sz="1800" kern="1200">
+                <a:solidFill>
+                  <a:schemeClr val="tx1"/>
+                </a:solidFill>
+                <a:latin typeface="+mn-lt"/>
+                <a:ea typeface="+mn-ea"/>
+                <a:cs typeface="+mn-cs"/>
+              </a:defRPr>
+            </a:lvl7pPr>
+            <a:lvl8pPr marL="3429000" indent="-228600" algn="l" defTabSz="914400" rtl="0" eaLnBrk="1" latinLnBrk="0" hangingPunct="1">
+              <a:lnSpc>
+                <a:spcPct val="90000"/>
+              </a:lnSpc>
+              <a:spcBef>
+                <a:spcPts val="500"/>
+              </a:spcBef>
+              <a:buFont typeface="Arial" panose="020B0604020202020204" pitchFamily="34" charset="0"/>
+              <a:buChar char="•"/>
+              <a:defRPr sz="1800" kern="1200">
+                <a:solidFill>
+                  <a:schemeClr val="tx1"/>
+                </a:solidFill>
+                <a:latin typeface="+mn-lt"/>
+                <a:ea typeface="+mn-ea"/>
+                <a:cs typeface="+mn-cs"/>
+              </a:defRPr>
+            </a:lvl8pPr>
+            <a:lvl9pPr marL="3886200" indent="-228600" algn="l" defTabSz="914400" rtl="0" eaLnBrk="1" latinLnBrk="0" hangingPunct="1">
+              <a:lnSpc>
+                <a:spcPct val="90000"/>
+              </a:lnSpc>
+              <a:spcBef>
+                <a:spcPts val="500"/>
+              </a:spcBef>
+              <a:buFont typeface="Arial" panose="020B0604020202020204" pitchFamily="34" charset="0"/>
+              <a:buChar char="•"/>
+              <a:defRPr sz="1800" kern="1200">
+                <a:solidFill>
+                  <a:schemeClr val="tx1"/>
+                </a:solidFill>
+                <a:latin typeface="+mn-lt"/>
+                <a:ea typeface="+mn-ea"/>
+                <a:cs typeface="+mn-cs"/>
+              </a:defRPr>
+            </a:lvl9pPr>
+          </a:lstStyle>
+          <a:p>
+            <a:r>
+              <a:rPr lang="en-US" dirty="0" smtClean="0"/>
+              <a:t>Direct access to native APIs in JS</a:t>
+            </a:r>
+            <a:endParaRPr lang="en-US" dirty="0"/>
+          </a:p>
+        </p:txBody>
+      </p:sp>
+      <p:pic>
+        <p:nvPicPr>
+          <p:cNvPr id="13" name="Picture 12"/>
+          <p:cNvPicPr>
+            <a:picLocks noChangeAspect="1"/>
+          </p:cNvPicPr>
+          <p:nvPr/>
+        </p:nvPicPr>
+        <p:blipFill>
+          <a:blip r:embed="rId2"/>
+          <a:stretch>
+            <a:fillRect/>
+          </a:stretch>
+        </p:blipFill>
+        <p:spPr>
+          <a:xfrm>
+            <a:off x="820328" y="3521541"/>
+            <a:ext cx="1181250" cy="1181250"/>
+          </a:xfrm>
+          <a:prstGeom prst="rect">
+            <a:avLst/>
+          </a:prstGeom>
+        </p:spPr>
+      </p:pic>
+      <p:sp>
+        <p:nvSpPr>
+          <p:cNvPr id="15" name="Text Placeholder 2"/>
+          <p:cNvSpPr txBox="1">
+            <a:spLocks/>
+          </p:cNvSpPr>
+          <p:nvPr/>
+        </p:nvSpPr>
+        <p:spPr>
+          <a:xfrm>
+            <a:off x="2216151" y="3669665"/>
+            <a:ext cx="994409" cy="882015"/>
+          </a:xfrm>
+          <a:prstGeom prst="rect">
+            <a:avLst/>
+          </a:prstGeom>
+        </p:spPr>
+        <p:txBody>
+          <a:bodyPr vert="horz" lIns="91440" tIns="45720" rIns="91440" bIns="45720" rtlCol="0">
+            <a:noAutofit/>
+          </a:bodyPr>
+          <a:lstStyle>
+            <a:lvl1pPr marL="182880" indent="365760" algn="l" defTabSz="91440" rtl="0" eaLnBrk="1" latinLnBrk="0" hangingPunct="1">
+              <a:lnSpc>
+                <a:spcPct val="100000"/>
+              </a:lnSpc>
+              <a:spcBef>
+                <a:spcPts val="1000"/>
+              </a:spcBef>
+              <a:buClr>
+                <a:srgbClr val="3C59FD"/>
+              </a:buClr>
+              <a:buSzPct val="80000"/>
+              <a:buFont typeface="Arial" panose="020B0604020202020204" pitchFamily="34" charset="0"/>
+              <a:buChar char="•"/>
+              <a:defRPr sz="3600" kern="1200" baseline="0">
+                <a:solidFill>
+                  <a:schemeClr val="tx1"/>
+                </a:solidFill>
+                <a:latin typeface="+mn-lt"/>
+                <a:ea typeface="Open Sans Light" panose="020B0306030504020204" pitchFamily="34" charset="0"/>
+                <a:cs typeface="Open Sans Light" panose="020B0306030504020204" pitchFamily="34" charset="0"/>
+              </a:defRPr>
+            </a:lvl1pPr>
+            <a:lvl2pPr marL="182880" indent="182880" algn="l" defTabSz="914400" rtl="0" eaLnBrk="1" latinLnBrk="0" hangingPunct="1">
+              <a:lnSpc>
+                <a:spcPct val="90000"/>
+              </a:lnSpc>
+              <a:spcBef>
+                <a:spcPts val="500"/>
+              </a:spcBef>
+              <a:buClr>
+                <a:srgbClr val="3C59FD"/>
+              </a:buClr>
+              <a:buSzPct val="80000"/>
+              <a:buFont typeface="Arial" panose="020B0604020202020204" pitchFamily="34" charset="0"/>
+              <a:buChar char="•"/>
+              <a:tabLst>
+                <a:tab pos="301752" algn="l"/>
+              </a:tabLst>
+              <a:defRPr sz="4000" kern="1200" baseline="0">
+                <a:solidFill>
+                  <a:schemeClr val="tx1"/>
+                </a:solidFill>
+                <a:latin typeface="+mn-lt"/>
+                <a:ea typeface="Open Sans Light" panose="020B0306030504020204" pitchFamily="34" charset="0"/>
+                <a:cs typeface="Open Sans Light" panose="020B0306030504020204" pitchFamily="34" charset="0"/>
+              </a:defRPr>
+            </a:lvl2pPr>
+            <a:lvl3pPr marL="365760" indent="365760" algn="l" defTabSz="914400" rtl="0" eaLnBrk="1" latinLnBrk="0" hangingPunct="1">
+              <a:lnSpc>
+                <a:spcPct val="100000"/>
+              </a:lnSpc>
+              <a:spcBef>
+                <a:spcPts val="500"/>
+              </a:spcBef>
+              <a:buClr>
+                <a:srgbClr val="3C59FD"/>
+              </a:buClr>
+              <a:buSzPct val="80000"/>
+              <a:buFont typeface="Arial" panose="020B0604020202020204" pitchFamily="34" charset="0"/>
+              <a:buChar char="•"/>
+              <a:defRPr sz="2800" kern="1200" baseline="0">
+                <a:solidFill>
+                  <a:schemeClr val="tx1"/>
+                </a:solidFill>
+                <a:latin typeface="+mn-lt"/>
+                <a:ea typeface="Open Sans" panose="020B0606030504020204" pitchFamily="34" charset="0"/>
+                <a:cs typeface="Open Sans" panose="020B0606030504020204" pitchFamily="34" charset="0"/>
+              </a:defRPr>
+            </a:lvl3pPr>
+            <a:lvl4pPr marL="548640" indent="182880" algn="l" defTabSz="914400" rtl="0" eaLnBrk="1" latinLnBrk="0" hangingPunct="1">
+              <a:lnSpc>
+                <a:spcPct val="90000"/>
+              </a:lnSpc>
+              <a:spcBef>
+                <a:spcPts val="500"/>
+              </a:spcBef>
+              <a:buClr>
+                <a:srgbClr val="3C59FD"/>
+              </a:buClr>
+              <a:buSzPct val="80000"/>
+              <a:buFont typeface="Arial" panose="020B0604020202020204" pitchFamily="34" charset="0"/>
+              <a:buChar char="•"/>
+              <a:defRPr sz="1800" kern="1200" baseline="0">
+                <a:solidFill>
+                  <a:schemeClr val="tx1"/>
+                </a:solidFill>
+                <a:latin typeface="+mn-lt"/>
+                <a:ea typeface="Open Sans" panose="020B0606030504020204" pitchFamily="34" charset="0"/>
+                <a:cs typeface="Open Sans" panose="020B0606030504020204" pitchFamily="34" charset="0"/>
+              </a:defRPr>
+            </a:lvl4pPr>
+            <a:lvl5pPr marL="731520" indent="182880" algn="l" defTabSz="914400" rtl="0" eaLnBrk="1" latinLnBrk="0" hangingPunct="1">
+              <a:lnSpc>
+                <a:spcPct val="90000"/>
+              </a:lnSpc>
+              <a:spcBef>
+                <a:spcPts val="500"/>
+              </a:spcBef>
+              <a:buClr>
+                <a:srgbClr val="3C59FD"/>
+              </a:buClr>
+              <a:buSzPct val="80000"/>
+              <a:buFont typeface="Arial" panose="020B0604020202020204" pitchFamily="34" charset="0"/>
+              <a:buChar char="•"/>
+              <a:defRPr sz="1600" kern="1200" baseline="0">
+                <a:solidFill>
+                  <a:schemeClr val="tx1"/>
+                </a:solidFill>
+                <a:latin typeface="+mn-lt"/>
+                <a:ea typeface="Open Sans" panose="020B0606030504020204" pitchFamily="34" charset="0"/>
+                <a:cs typeface="Open Sans" panose="020B0606030504020204" pitchFamily="34" charset="0"/>
+              </a:defRPr>
+            </a:lvl5pPr>
+            <a:lvl6pPr marL="2514600" indent="-228600" algn="l" defTabSz="914400" rtl="0" eaLnBrk="1" latinLnBrk="0" hangingPunct="1">
+              <a:lnSpc>
+                <a:spcPct val="90000"/>
+              </a:lnSpc>
+              <a:spcBef>
+                <a:spcPts val="500"/>
+              </a:spcBef>
+              <a:buFont typeface="Arial" panose="020B0604020202020204" pitchFamily="34" charset="0"/>
+              <a:buChar char="•"/>
+              <a:defRPr sz="1200" kern="1200" cap="all" spc="0" baseline="0">
+                <a:solidFill>
+                  <a:srgbClr val="95BC46"/>
+                </a:solidFill>
+                <a:latin typeface="Open Sans" panose="020B0606030504020204" pitchFamily="34" charset="0"/>
+                <a:ea typeface="Open Sans" panose="020B0606030504020204" pitchFamily="34" charset="0"/>
+                <a:cs typeface="Open Sans" panose="020B0606030504020204" pitchFamily="34" charset="0"/>
+              </a:defRPr>
+            </a:lvl6pPr>
+            <a:lvl7pPr marL="2971800" indent="-228600" algn="l" defTabSz="914400" rtl="0" eaLnBrk="1" latinLnBrk="0" hangingPunct="1">
+              <a:lnSpc>
+                <a:spcPct val="90000"/>
+              </a:lnSpc>
+              <a:spcBef>
+                <a:spcPts val="500"/>
+              </a:spcBef>
+              <a:buFont typeface="Arial" panose="020B0604020202020204" pitchFamily="34" charset="0"/>
+              <a:buChar char="•"/>
+              <a:defRPr sz="1800" kern="1200">
+                <a:solidFill>
+                  <a:schemeClr val="tx1"/>
+                </a:solidFill>
+                <a:latin typeface="+mn-lt"/>
+                <a:ea typeface="+mn-ea"/>
+                <a:cs typeface="+mn-cs"/>
+              </a:defRPr>
+            </a:lvl7pPr>
+            <a:lvl8pPr marL="3429000" indent="-228600" algn="l" defTabSz="914400" rtl="0" eaLnBrk="1" latinLnBrk="0" hangingPunct="1">
+              <a:lnSpc>
+                <a:spcPct val="90000"/>
+              </a:lnSpc>
+              <a:spcBef>
+                <a:spcPts val="500"/>
+              </a:spcBef>
+              <a:buFont typeface="Arial" panose="020B0604020202020204" pitchFamily="34" charset="0"/>
+              <a:buChar char="•"/>
+              <a:defRPr sz="1800" kern="1200">
+                <a:solidFill>
+                  <a:schemeClr val="tx1"/>
+                </a:solidFill>
+                <a:latin typeface="+mn-lt"/>
+                <a:ea typeface="+mn-ea"/>
+                <a:cs typeface="+mn-cs"/>
+              </a:defRPr>
+            </a:lvl8pPr>
+            <a:lvl9pPr marL="3886200" indent="-228600" algn="l" defTabSz="914400" rtl="0" eaLnBrk="1" latinLnBrk="0" hangingPunct="1">
+              <a:lnSpc>
+                <a:spcPct val="90000"/>
+              </a:lnSpc>
+              <a:spcBef>
+                <a:spcPts val="500"/>
+              </a:spcBef>
+              <a:buFont typeface="Arial" panose="020B0604020202020204" pitchFamily="34" charset="0"/>
+              <a:buChar char="•"/>
+              <a:defRPr sz="1800" kern="1200">
+                <a:solidFill>
+                  <a:schemeClr val="tx1"/>
+                </a:solidFill>
+                <a:latin typeface="+mn-lt"/>
+                <a:ea typeface="+mn-ea"/>
+                <a:cs typeface="+mn-cs"/>
+              </a:defRPr>
+            </a:lvl9pPr>
+          </a:lstStyle>
+          <a:p>
+            <a:pPr indent="0">
+              <a:buNone/>
+            </a:pPr>
+            <a:r>
+              <a:rPr lang="en-US" sz="4800" b="1" dirty="0" smtClean="0"/>
+              <a:t>!=</a:t>
+            </a:r>
+            <a:endParaRPr lang="en-US" sz="4800" b="1" dirty="0"/>
+          </a:p>
+        </p:txBody>
+      </p:sp>
     </p:spTree>
     <p:extLst>
       <p:ext uri="{BB962C8B-B14F-4D97-AF65-F5344CB8AC3E}">
@@ -8619,9 +8302,317 @@
   <p:timing>
     <p:tnLst>
       <p:par>
-        <p:cTn xmlns:p14="http://schemas.microsoft.com/office/powerpoint/2010/main" id="1" dur="indefinite" restart="never" nodeType="tmRoot"/>
+        <p:cTn xmlns:p14="http://schemas.microsoft.com/office/powerpoint/2010/main" id="1" dur="indefinite" restart="never" nodeType="tmRoot">
+          <p:childTnLst>
+            <p:seq concurrent="1" nextAc="seek">
+              <p:cTn id="2" dur="indefinite" nodeType="mainSeq">
+                <p:childTnLst>
+                  <p:par>
+                    <p:cTn id="3" fill="hold">
+                      <p:stCondLst>
+                        <p:cond delay="indefinite"/>
+                      </p:stCondLst>
+                      <p:childTnLst>
+                        <p:par>
+                          <p:cTn id="4" fill="hold">
+                            <p:stCondLst>
+                              <p:cond delay="0"/>
+                            </p:stCondLst>
+                            <p:childTnLst>
+                              <p:par>
+                                <p:cTn id="5" presetID="1" presetClass="entr" presetSubtype="0" fill="hold" nodeType="clickEffect">
+                                  <p:stCondLst>
+                                    <p:cond delay="0"/>
+                                  </p:stCondLst>
+                                  <p:childTnLst>
+                                    <p:set>
+                                      <p:cBhvr>
+                                        <p:cTn id="6" dur="1" fill="hold">
+                                          <p:stCondLst>
+                                            <p:cond delay="0"/>
+                                          </p:stCondLst>
+                                        </p:cTn>
+                                        <p:tgtEl>
+                                          <p:spTgt spid="5"/>
+                                        </p:tgtEl>
+                                        <p:attrNameLst>
+                                          <p:attrName>style.visibility</p:attrName>
+                                        </p:attrNameLst>
+                                      </p:cBhvr>
+                                      <p:to>
+                                        <p:strVal val="visible"/>
+                                      </p:to>
+                                    </p:set>
+                                  </p:childTnLst>
+                                </p:cTn>
+                              </p:par>
+                              <p:par>
+                                <p:cTn id="7" presetID="1" presetClass="entr" presetSubtype="0" fill="hold" nodeType="withEffect">
+                                  <p:stCondLst>
+                                    <p:cond delay="0"/>
+                                  </p:stCondLst>
+                                  <p:childTnLst>
+                                    <p:set>
+                                      <p:cBhvr>
+                                        <p:cTn id="8" dur="1" fill="hold">
+                                          <p:stCondLst>
+                                            <p:cond delay="0"/>
+                                          </p:stCondLst>
+                                        </p:cTn>
+                                        <p:tgtEl>
+                                          <p:spTgt spid="7"/>
+                                        </p:tgtEl>
+                                        <p:attrNameLst>
+                                          <p:attrName>style.visibility</p:attrName>
+                                        </p:attrNameLst>
+                                      </p:cBhvr>
+                                      <p:to>
+                                        <p:strVal val="visible"/>
+                                      </p:to>
+                                    </p:set>
+                                  </p:childTnLst>
+                                </p:cTn>
+                              </p:par>
+                              <p:par>
+                                <p:cTn id="9" presetID="1" presetClass="entr" presetSubtype="0" fill="hold" grpId="0" nodeType="withEffect">
+                                  <p:stCondLst>
+                                    <p:cond delay="0"/>
+                                  </p:stCondLst>
+                                  <p:childTnLst>
+                                    <p:set>
+                                      <p:cBhvr>
+                                        <p:cTn id="10" dur="1" fill="hold">
+                                          <p:stCondLst>
+                                            <p:cond delay="0"/>
+                                          </p:stCondLst>
+                                        </p:cTn>
+                                        <p:tgtEl>
+                                          <p:spTgt spid="8"/>
+                                        </p:tgtEl>
+                                        <p:attrNameLst>
+                                          <p:attrName>style.visibility</p:attrName>
+                                        </p:attrNameLst>
+                                      </p:cBhvr>
+                                      <p:to>
+                                        <p:strVal val="visible"/>
+                                      </p:to>
+                                    </p:set>
+                                  </p:childTnLst>
+                                </p:cTn>
+                              </p:par>
+                              <p:par>
+                                <p:cTn id="11" presetID="1" presetClass="entr" presetSubtype="0" fill="hold" grpId="0" nodeType="withEffect">
+                                  <p:stCondLst>
+                                    <p:cond delay="0"/>
+                                  </p:stCondLst>
+                                  <p:childTnLst>
+                                    <p:set>
+                                      <p:cBhvr>
+                                        <p:cTn id="12" dur="1" fill="hold">
+                                          <p:stCondLst>
+                                            <p:cond delay="0"/>
+                                          </p:stCondLst>
+                                        </p:cTn>
+                                        <p:tgtEl>
+                                          <p:spTgt spid="9"/>
+                                        </p:tgtEl>
+                                        <p:attrNameLst>
+                                          <p:attrName>style.visibility</p:attrName>
+                                        </p:attrNameLst>
+                                      </p:cBhvr>
+                                      <p:to>
+                                        <p:strVal val="visible"/>
+                                      </p:to>
+                                    </p:set>
+                                  </p:childTnLst>
+                                </p:cTn>
+                              </p:par>
+                              <p:par>
+                                <p:cTn id="13" presetID="1" presetClass="entr" presetSubtype="0" fill="hold" nodeType="withEffect">
+                                  <p:stCondLst>
+                                    <p:cond delay="0"/>
+                                  </p:stCondLst>
+                                  <p:childTnLst>
+                                    <p:set>
+                                      <p:cBhvr>
+                                        <p:cTn id="14" dur="1" fill="hold">
+                                          <p:stCondLst>
+                                            <p:cond delay="0"/>
+                                          </p:stCondLst>
+                                        </p:cTn>
+                                        <p:tgtEl>
+                                          <p:spTgt spid="2"/>
+                                        </p:tgtEl>
+                                        <p:attrNameLst>
+                                          <p:attrName>style.visibility</p:attrName>
+                                        </p:attrNameLst>
+                                      </p:cBhvr>
+                                      <p:to>
+                                        <p:strVal val="visible"/>
+                                      </p:to>
+                                    </p:set>
+                                  </p:childTnLst>
+                                </p:cTn>
+                              </p:par>
+                            </p:childTnLst>
+                          </p:cTn>
+                        </p:par>
+                      </p:childTnLst>
+                    </p:cTn>
+                  </p:par>
+                  <p:par>
+                    <p:cTn id="15" fill="hold">
+                      <p:stCondLst>
+                        <p:cond delay="indefinite"/>
+                      </p:stCondLst>
+                      <p:childTnLst>
+                        <p:par>
+                          <p:cTn id="16" fill="hold">
+                            <p:stCondLst>
+                              <p:cond delay="0"/>
+                            </p:stCondLst>
+                            <p:childTnLst>
+                              <p:par>
+                                <p:cTn id="17" presetID="1" presetClass="entr" presetSubtype="0" fill="hold" nodeType="clickEffect">
+                                  <p:stCondLst>
+                                    <p:cond delay="0"/>
+                                  </p:stCondLst>
+                                  <p:childTnLst>
+                                    <p:set>
+                                      <p:cBhvr>
+                                        <p:cTn id="18" dur="1" fill="hold">
+                                          <p:stCondLst>
+                                            <p:cond delay="0"/>
+                                          </p:stCondLst>
+                                        </p:cTn>
+                                        <p:tgtEl>
+                                          <p:spTgt spid="11"/>
+                                        </p:tgtEl>
+                                        <p:attrNameLst>
+                                          <p:attrName>style.visibility</p:attrName>
+                                        </p:attrNameLst>
+                                      </p:cBhvr>
+                                      <p:to>
+                                        <p:strVal val="visible"/>
+                                      </p:to>
+                                    </p:set>
+                                  </p:childTnLst>
+                                </p:cTn>
+                              </p:par>
+                              <p:par>
+                                <p:cTn id="19" presetID="1" presetClass="entr" presetSubtype="0" fill="hold" grpId="0" nodeType="withEffect">
+                                  <p:stCondLst>
+                                    <p:cond delay="0"/>
+                                  </p:stCondLst>
+                                  <p:childTnLst>
+                                    <p:set>
+                                      <p:cBhvr>
+                                        <p:cTn id="20" dur="1" fill="hold">
+                                          <p:stCondLst>
+                                            <p:cond delay="0"/>
+                                          </p:stCondLst>
+                                        </p:cTn>
+                                        <p:tgtEl>
+                                          <p:spTgt spid="12"/>
+                                        </p:tgtEl>
+                                        <p:attrNameLst>
+                                          <p:attrName>style.visibility</p:attrName>
+                                        </p:attrNameLst>
+                                      </p:cBhvr>
+                                      <p:to>
+                                        <p:strVal val="visible"/>
+                                      </p:to>
+                                    </p:set>
+                                  </p:childTnLst>
+                                </p:cTn>
+                              </p:par>
+                              <p:par>
+                                <p:cTn id="21" presetID="1" presetClass="entr" presetSubtype="0" fill="hold" nodeType="withEffect">
+                                  <p:stCondLst>
+                                    <p:cond delay="0"/>
+                                  </p:stCondLst>
+                                  <p:childTnLst>
+                                    <p:set>
+                                      <p:cBhvr>
+                                        <p:cTn id="22" dur="1" fill="hold">
+                                          <p:stCondLst>
+                                            <p:cond delay="0"/>
+                                          </p:stCondLst>
+                                        </p:cTn>
+                                        <p:tgtEl>
+                                          <p:spTgt spid="13"/>
+                                        </p:tgtEl>
+                                        <p:attrNameLst>
+                                          <p:attrName>style.visibility</p:attrName>
+                                        </p:attrNameLst>
+                                      </p:cBhvr>
+                                      <p:to>
+                                        <p:strVal val="visible"/>
+                                      </p:to>
+                                    </p:set>
+                                  </p:childTnLst>
+                                </p:cTn>
+                              </p:par>
+                              <p:par>
+                                <p:cTn id="23" presetID="1" presetClass="entr" presetSubtype="0" fill="hold" grpId="0" nodeType="withEffect">
+                                  <p:stCondLst>
+                                    <p:cond delay="0"/>
+                                  </p:stCondLst>
+                                  <p:childTnLst>
+                                    <p:set>
+                                      <p:cBhvr>
+                                        <p:cTn id="24" dur="1" fill="hold">
+                                          <p:stCondLst>
+                                            <p:cond delay="0"/>
+                                          </p:stCondLst>
+                                        </p:cTn>
+                                        <p:tgtEl>
+                                          <p:spTgt spid="15"/>
+                                        </p:tgtEl>
+                                        <p:attrNameLst>
+                                          <p:attrName>style.visibility</p:attrName>
+                                        </p:attrNameLst>
+                                      </p:cBhvr>
+                                      <p:to>
+                                        <p:strVal val="visible"/>
+                                      </p:to>
+                                    </p:set>
+                                  </p:childTnLst>
+                                </p:cTn>
+                              </p:par>
+                            </p:childTnLst>
+                          </p:cTn>
+                        </p:par>
+                      </p:childTnLst>
+                    </p:cTn>
+                  </p:par>
+                </p:childTnLst>
+              </p:cTn>
+              <p:prevCondLst>
+                <p:cond evt="onPrev" delay="0">
+                  <p:tgtEl>
+                    <p:sldTgt/>
+                  </p:tgtEl>
+                </p:cond>
+              </p:prevCondLst>
+              <p:nextCondLst>
+                <p:cond evt="onNext" delay="0">
+                  <p:tgtEl>
+                    <p:sldTgt/>
+                  </p:tgtEl>
+                </p:cond>
+              </p:nextCondLst>
+            </p:seq>
+          </p:childTnLst>
+        </p:cTn>
       </p:par>
     </p:tnLst>
+    <p:bldLst>
+      <p:bldP spid="8" grpId="0"/>
+      <p:bldP spid="9" grpId="0"/>
+      <p:bldP spid="12" grpId="0"/>
+      <p:bldP spid="15" grpId="0"/>
+    </p:bldLst>
   </p:timing>
 </p:sld>
 </file>
@@ -8790,7 +8781,7 @@
   <a:extraClrSchemeLst/>
   <a:extLst>
     <a:ext uri="{05A4C25C-085E-4340-85A3-A5531E510DB2}">
-      <thm15:themeFamily xmlns:thm15="http://schemas.microsoft.com/office/thememl/2012/main" xmlns="" name="TelerikGlobalGathering" id="{7E85FF9B-8877-49BD-BF1B-DBAE84329A25}" vid="{14ED4DDA-1649-4FE2-8BAA-9DDDE833FA16}"/>
+      <thm15:themeFamily xmlns="" xmlns:thm15="http://schemas.microsoft.com/office/thememl/2012/main" name="TelerikGlobalGathering" id="{7E85FF9B-8877-49BD-BF1B-DBAE84329A25}" vid="{14ED4DDA-1649-4FE2-8BAA-9DDDE833FA16}"/>
     </a:ext>
   </a:extLst>
 </a:theme>
@@ -9371,7 +9362,7 @@
   <a:extraClrSchemeLst/>
   <a:extLst>
     <a:ext uri="{05A4C25C-085E-4340-85A3-A5531E510DB2}">
-      <thm15:themeFamily xmlns:thm15="http://schemas.microsoft.com/office/thememl/2012/main" xmlns="" name="Office Theme" id="{62F939B6-93AF-4DB8-9C6B-D6C7DFDC589F}" vid="{4A3C46E8-61CC-4603-A589-7422A47A8E4A}"/>
+      <thm15:themeFamily xmlns="" xmlns:thm15="http://schemas.microsoft.com/office/thememl/2012/main" name="Office Theme" id="{62F939B6-93AF-4DB8-9C6B-D6C7DFDC589F}" vid="{4A3C46E8-61CC-4603-A589-7422A47A8E4A}"/>
     </a:ext>
   </a:extLst>
 </a:theme>

</xml_diff>